<commit_message>
Imagenes ocupan todo el tamaño de la pantalla
</commit_message>
<xml_diff>
--- a/src/resources/BienvenidosFondo.pptx
+++ b/src/resources/BienvenidosFondo.pptx
@@ -262,7 +262,7 @@
           <a:p>
             <a:fld id="{CD7D159F-57E4-498A-BE1F-15720088F759}" type="datetimeFigureOut">
               <a:rPr lang="es-CO" smtClean="0"/>
-              <a:t>25/08/2019</a:t>
+              <a:t>1/09/2019</a:t>
             </a:fld>
             <a:endParaRPr lang="es-CO"/>
           </a:p>
@@ -462,7 +462,7 @@
           <a:p>
             <a:fld id="{CD7D159F-57E4-498A-BE1F-15720088F759}" type="datetimeFigureOut">
               <a:rPr lang="es-CO" smtClean="0"/>
-              <a:t>25/08/2019</a:t>
+              <a:t>1/09/2019</a:t>
             </a:fld>
             <a:endParaRPr lang="es-CO"/>
           </a:p>
@@ -672,7 +672,7 @@
           <a:p>
             <a:fld id="{CD7D159F-57E4-498A-BE1F-15720088F759}" type="datetimeFigureOut">
               <a:rPr lang="es-CO" smtClean="0"/>
-              <a:t>25/08/2019</a:t>
+              <a:t>1/09/2019</a:t>
             </a:fld>
             <a:endParaRPr lang="es-CO"/>
           </a:p>
@@ -872,7 +872,7 @@
           <a:p>
             <a:fld id="{CD7D159F-57E4-498A-BE1F-15720088F759}" type="datetimeFigureOut">
               <a:rPr lang="es-CO" smtClean="0"/>
-              <a:t>25/08/2019</a:t>
+              <a:t>1/09/2019</a:t>
             </a:fld>
             <a:endParaRPr lang="es-CO"/>
           </a:p>
@@ -1148,7 +1148,7 @@
           <a:p>
             <a:fld id="{CD7D159F-57E4-498A-BE1F-15720088F759}" type="datetimeFigureOut">
               <a:rPr lang="es-CO" smtClean="0"/>
-              <a:t>25/08/2019</a:t>
+              <a:t>1/09/2019</a:t>
             </a:fld>
             <a:endParaRPr lang="es-CO"/>
           </a:p>
@@ -1416,7 +1416,7 @@
           <a:p>
             <a:fld id="{CD7D159F-57E4-498A-BE1F-15720088F759}" type="datetimeFigureOut">
               <a:rPr lang="es-CO" smtClean="0"/>
-              <a:t>25/08/2019</a:t>
+              <a:t>1/09/2019</a:t>
             </a:fld>
             <a:endParaRPr lang="es-CO"/>
           </a:p>
@@ -1831,7 +1831,7 @@
           <a:p>
             <a:fld id="{CD7D159F-57E4-498A-BE1F-15720088F759}" type="datetimeFigureOut">
               <a:rPr lang="es-CO" smtClean="0"/>
-              <a:t>25/08/2019</a:t>
+              <a:t>1/09/2019</a:t>
             </a:fld>
             <a:endParaRPr lang="es-CO"/>
           </a:p>
@@ -1973,7 +1973,7 @@
           <a:p>
             <a:fld id="{CD7D159F-57E4-498A-BE1F-15720088F759}" type="datetimeFigureOut">
               <a:rPr lang="es-CO" smtClean="0"/>
-              <a:t>25/08/2019</a:t>
+              <a:t>1/09/2019</a:t>
             </a:fld>
             <a:endParaRPr lang="es-CO"/>
           </a:p>
@@ -2086,7 +2086,7 @@
           <a:p>
             <a:fld id="{CD7D159F-57E4-498A-BE1F-15720088F759}" type="datetimeFigureOut">
               <a:rPr lang="es-CO" smtClean="0"/>
-              <a:t>25/08/2019</a:t>
+              <a:t>1/09/2019</a:t>
             </a:fld>
             <a:endParaRPr lang="es-CO"/>
           </a:p>
@@ -2399,7 +2399,7 @@
           <a:p>
             <a:fld id="{CD7D159F-57E4-498A-BE1F-15720088F759}" type="datetimeFigureOut">
               <a:rPr lang="es-CO" smtClean="0"/>
-              <a:t>25/08/2019</a:t>
+              <a:t>1/09/2019</a:t>
             </a:fld>
             <a:endParaRPr lang="es-CO"/>
           </a:p>
@@ -2688,7 +2688,7 @@
           <a:p>
             <a:fld id="{CD7D159F-57E4-498A-BE1F-15720088F759}" type="datetimeFigureOut">
               <a:rPr lang="es-CO" smtClean="0"/>
-              <a:t>25/08/2019</a:t>
+              <a:t>1/09/2019</a:t>
             </a:fld>
             <a:endParaRPr lang="es-CO"/>
           </a:p>
@@ -2931,7 +2931,7 @@
           <a:p>
             <a:fld id="{CD7D159F-57E4-498A-BE1F-15720088F759}" type="datetimeFigureOut">
               <a:rPr lang="es-CO" smtClean="0"/>
-              <a:t>25/08/2019</a:t>
+              <a:t>1/09/2019</a:t>
             </a:fld>
             <a:endParaRPr lang="es-CO"/>
           </a:p>
@@ -4215,7 +4215,7 @@
           </p:nvPicPr>
           <p:blipFill>
             <a:blip r:embed="rId2">
-              <a:alphaModFix amt="50000"/>
+              <a:alphaModFix amt="85000"/>
               <a:extLst>
                 <a:ext uri="{28A0092B-C50C-407E-A947-70E740481C1C}">
                   <a14:useLocalDpi xmlns:a14="http://schemas.microsoft.com/office/drawing/2010/main" val="0"/>

</xml_diff>